<commit_message>
Atualização de documentos. Correção de métricas no dashboard estático
</commit_message>
<xml_diff>
--- a/documentos/Diagrama_Negocio_VISS.pptx
+++ b/documentos/Diagrama_Negocio_VISS.pptx
@@ -112,6 +112,14 @@
 </p:presentation>
 </file>
 
+<file path=ppt/revisionInfo.xml><?xml version="1.0" encoding="utf-8"?>
+<p1510:revInfo xmlns:a="http://schemas.openxmlformats.org/drawingml/2006/main" xmlns:r="http://schemas.openxmlformats.org/officeDocument/2006/relationships" xmlns:p1510="http://schemas.microsoft.com/office/powerpoint/2015/10/main">
+  <p1510:revLst>
+    <p1510:client id="{FA7F90D7-EF03-4EF3-A18A-F3C57FBF545B}" v="4" dt="2023-08-22T14:22:37.145"/>
+  </p1510:revLst>
+</p1510:revInfo>
+</file>
+
 <file path=ppt/slideLayouts/slideLayout1.xml><?xml version="1.0" encoding="utf-8"?>
 <p:sldLayout xmlns:a="http://schemas.openxmlformats.org/drawingml/2006/main" xmlns:r="http://schemas.openxmlformats.org/officeDocument/2006/relationships" xmlns:p="http://schemas.openxmlformats.org/presentationml/2006/main" type="title" preserve="1">
   <p:cSld name="Title Slide">
@@ -261,7 +269,7 @@
           <a:p>
             <a:fld id="{72DB7DE1-E8B4-4C48-9794-34A0E4915213}" type="datetimeFigureOut">
               <a:rPr lang="pt-BR" smtClean="0"/>
-              <a:t>22/08/2023</a:t>
+              <a:t>19/09/2023</a:t>
             </a:fld>
             <a:endParaRPr lang="pt-BR"/>
           </a:p>
@@ -461,7 +469,7 @@
           <a:p>
             <a:fld id="{72DB7DE1-E8B4-4C48-9794-34A0E4915213}" type="datetimeFigureOut">
               <a:rPr lang="pt-BR" smtClean="0"/>
-              <a:t>22/08/2023</a:t>
+              <a:t>19/09/2023</a:t>
             </a:fld>
             <a:endParaRPr lang="pt-BR"/>
           </a:p>
@@ -671,7 +679,7 @@
           <a:p>
             <a:fld id="{72DB7DE1-E8B4-4C48-9794-34A0E4915213}" type="datetimeFigureOut">
               <a:rPr lang="pt-BR" smtClean="0"/>
-              <a:t>22/08/2023</a:t>
+              <a:t>19/09/2023</a:t>
             </a:fld>
             <a:endParaRPr lang="pt-BR"/>
           </a:p>
@@ -871,7 +879,7 @@
           <a:p>
             <a:fld id="{72DB7DE1-E8B4-4C48-9794-34A0E4915213}" type="datetimeFigureOut">
               <a:rPr lang="pt-BR" smtClean="0"/>
-              <a:t>22/08/2023</a:t>
+              <a:t>19/09/2023</a:t>
             </a:fld>
             <a:endParaRPr lang="pt-BR"/>
           </a:p>
@@ -1147,7 +1155,7 @@
           <a:p>
             <a:fld id="{72DB7DE1-E8B4-4C48-9794-34A0E4915213}" type="datetimeFigureOut">
               <a:rPr lang="pt-BR" smtClean="0"/>
-              <a:t>22/08/2023</a:t>
+              <a:t>19/09/2023</a:t>
             </a:fld>
             <a:endParaRPr lang="pt-BR"/>
           </a:p>
@@ -1415,7 +1423,7 @@
           <a:p>
             <a:fld id="{72DB7DE1-E8B4-4C48-9794-34A0E4915213}" type="datetimeFigureOut">
               <a:rPr lang="pt-BR" smtClean="0"/>
-              <a:t>22/08/2023</a:t>
+              <a:t>19/09/2023</a:t>
             </a:fld>
             <a:endParaRPr lang="pt-BR"/>
           </a:p>
@@ -1830,7 +1838,7 @@
           <a:p>
             <a:fld id="{72DB7DE1-E8B4-4C48-9794-34A0E4915213}" type="datetimeFigureOut">
               <a:rPr lang="pt-BR" smtClean="0"/>
-              <a:t>22/08/2023</a:t>
+              <a:t>19/09/2023</a:t>
             </a:fld>
             <a:endParaRPr lang="pt-BR"/>
           </a:p>
@@ -1972,7 +1980,7 @@
           <a:p>
             <a:fld id="{72DB7DE1-E8B4-4C48-9794-34A0E4915213}" type="datetimeFigureOut">
               <a:rPr lang="pt-BR" smtClean="0"/>
-              <a:t>22/08/2023</a:t>
+              <a:t>19/09/2023</a:t>
             </a:fld>
             <a:endParaRPr lang="pt-BR"/>
           </a:p>
@@ -2085,7 +2093,7 @@
           <a:p>
             <a:fld id="{72DB7DE1-E8B4-4C48-9794-34A0E4915213}" type="datetimeFigureOut">
               <a:rPr lang="pt-BR" smtClean="0"/>
-              <a:t>22/08/2023</a:t>
+              <a:t>19/09/2023</a:t>
             </a:fld>
             <a:endParaRPr lang="pt-BR"/>
           </a:p>
@@ -2398,7 +2406,7 @@
           <a:p>
             <a:fld id="{72DB7DE1-E8B4-4C48-9794-34A0E4915213}" type="datetimeFigureOut">
               <a:rPr lang="pt-BR" smtClean="0"/>
-              <a:t>22/08/2023</a:t>
+              <a:t>19/09/2023</a:t>
             </a:fld>
             <a:endParaRPr lang="pt-BR"/>
           </a:p>
@@ -2687,7 +2695,7 @@
           <a:p>
             <a:fld id="{72DB7DE1-E8B4-4C48-9794-34A0E4915213}" type="datetimeFigureOut">
               <a:rPr lang="pt-BR" smtClean="0"/>
-              <a:t>22/08/2023</a:t>
+              <a:t>19/09/2023</a:t>
             </a:fld>
             <a:endParaRPr lang="pt-BR"/>
           </a:p>
@@ -2930,7 +2938,7 @@
           <a:p>
             <a:fld id="{72DB7DE1-E8B4-4C48-9794-34A0E4915213}" type="datetimeFigureOut">
               <a:rPr lang="pt-BR" smtClean="0"/>
-              <a:t>22/08/2023</a:t>
+              <a:t>19/09/2023</a:t>
             </a:fld>
             <a:endParaRPr lang="pt-BR"/>
           </a:p>
@@ -3349,10 +3357,10 @@
       </p:grpSpPr>
       <p:grpSp>
         <p:nvGrpSpPr>
-          <p:cNvPr id="12" name="Group 11">
-            <a:extLst>
-              <a:ext uri="{FF2B5EF4-FFF2-40B4-BE49-F238E27FC236}">
-                <a16:creationId xmlns:a16="http://schemas.microsoft.com/office/drawing/2014/main" id="{7948C798-5402-B5A7-7D20-33A4F500B5DF}"/>
+          <p:cNvPr id="3" name="Group 2">
+            <a:extLst>
+              <a:ext uri="{FF2B5EF4-FFF2-40B4-BE49-F238E27FC236}">
+                <a16:creationId xmlns:a16="http://schemas.microsoft.com/office/drawing/2014/main" id="{B6B89954-E956-4011-5251-544F9FDCC01D}"/>
               </a:ext>
             </a:extLst>
           </p:cNvPr>
@@ -3362,9 +3370,9 @@
         <p:grpSpPr>
           <a:xfrm>
             <a:off x="794928" y="1716922"/>
-            <a:ext cx="1696278" cy="914400"/>
-            <a:chOff x="1132858" y="4936131"/>
-            <a:chExt cx="1696278" cy="914400"/>
+            <a:ext cx="1696278" cy="1007164"/>
+            <a:chOff x="794928" y="1716922"/>
+            <a:chExt cx="1696278" cy="1007164"/>
           </a:xfrm>
         </p:grpSpPr>
         <p:pic>
@@ -3398,7 +3406,7 @@
           </p:blipFill>
           <p:spPr>
             <a:xfrm>
-              <a:off x="1914736" y="4936131"/>
+              <a:off x="1576806" y="1809686"/>
               <a:ext cx="914400" cy="914400"/>
             </a:xfrm>
             <a:prstGeom prst="rect">
@@ -3437,7 +3445,7 @@
           </p:blipFill>
           <p:spPr>
             <a:xfrm flipH="1">
-              <a:off x="1132858" y="4936131"/>
+              <a:off x="794928" y="1716922"/>
               <a:ext cx="914400" cy="914400"/>
             </a:xfrm>
             <a:prstGeom prst="rect">
@@ -3448,10 +3456,10 @@
       </p:grpSp>
       <p:grpSp>
         <p:nvGrpSpPr>
-          <p:cNvPr id="11" name="Group 10">
-            <a:extLst>
-              <a:ext uri="{FF2B5EF4-FFF2-40B4-BE49-F238E27FC236}">
-                <a16:creationId xmlns:a16="http://schemas.microsoft.com/office/drawing/2014/main" id="{5BF0BA6E-F2C1-1D8E-2A64-C0BC37C90CC9}"/>
+          <p:cNvPr id="6" name="Group 5">
+            <a:extLst>
+              <a:ext uri="{FF2B5EF4-FFF2-40B4-BE49-F238E27FC236}">
+                <a16:creationId xmlns:a16="http://schemas.microsoft.com/office/drawing/2014/main" id="{2F1C80C7-C187-224A-9420-BEC41B413FEC}"/>
               </a:ext>
             </a:extLst>
           </p:cNvPr>
@@ -3461,9 +3469,9 @@
         <p:grpSpPr>
           <a:xfrm>
             <a:off x="1238875" y="802522"/>
-            <a:ext cx="1722783" cy="914400"/>
+            <a:ext cx="1722783" cy="1007164"/>
             <a:chOff x="1238875" y="802522"/>
-            <a:chExt cx="1722783" cy="914400"/>
+            <a:chExt cx="1722783" cy="1007164"/>
           </a:xfrm>
         </p:grpSpPr>
         <p:pic>
@@ -3497,7 +3505,7 @@
           </p:blipFill>
           <p:spPr>
             <a:xfrm>
-              <a:off x="2047258" y="802522"/>
+              <a:off x="2047258" y="895286"/>
               <a:ext cx="914400" cy="914400"/>
             </a:xfrm>
             <a:prstGeom prst="rect">
@@ -3828,6 +3836,7 @@
             </a:extLst>
           </p:cNvPr>
           <p:cNvCxnSpPr>
+            <a:cxnSpLocks/>
             <a:stCxn id="7" idx="2"/>
             <a:endCxn id="16" idx="1"/>
           </p:cNvCxnSpPr>
@@ -3835,8 +3844,8 @@
         </p:nvCxnSpPr>
         <p:spPr>
           <a:xfrm rot="16200000" flipH="1">
-            <a:off x="2083958" y="2581370"/>
-            <a:ext cx="1261959" cy="1361862"/>
+            <a:off x="2130340" y="2627752"/>
+            <a:ext cx="1169195" cy="1361862"/>
           </a:xfrm>
           <a:prstGeom prst="curvedConnector2">
             <a:avLst/>
@@ -4036,7 +4045,7 @@
         </p:nvSpPr>
         <p:spPr>
           <a:xfrm>
-            <a:off x="2892285" y="4429026"/>
+            <a:off x="2778013" y="4500023"/>
             <a:ext cx="1958011" cy="1200329"/>
           </a:xfrm>
           <a:prstGeom prst="rect">
@@ -4807,15 +4816,6 @@
 </file>
 
 <file path=customXml/item2.xml><?xml version="1.0" encoding="utf-8"?>
-<?mso-contentType ?>
-<FormTemplates xmlns="http://schemas.microsoft.com/sharepoint/v3/contenttype/forms">
-  <Display>DocumentLibraryForm</Display>
-  <Edit>DocumentLibraryForm</Edit>
-  <New>DocumentLibraryForm</New>
-</FormTemplates>
-</file>
-
-<file path=customXml/item3.xml><?xml version="1.0" encoding="utf-8"?>
 <ct:contentTypeSchema xmlns:ct="http://schemas.microsoft.com/office/2006/metadata/contentType" xmlns:ma="http://schemas.microsoft.com/office/2006/metadata/properties/metaAttributes" ct:_="" ma:_="" ma:contentTypeName="Document" ma:contentTypeID="0x0101003236BA383373F9498A6F9C22979A1745" ma:contentTypeVersion="8" ma:contentTypeDescription="Create a new document." ma:contentTypeScope="" ma:versionID="105d9e49bcf5018a2b9f673ffb6bea80">
   <xsd:schema xmlns:xsd="http://www.w3.org/2001/XMLSchema" xmlns:xs="http://www.w3.org/2001/XMLSchema" xmlns:p="http://schemas.microsoft.com/office/2006/metadata/properties" xmlns:ns3="58bd19be-68b1-440c-82af-6d4de24fec6c" xmlns:ns4="3ffc9a63-5890-437d-bab6-67d84705b086" targetNamespace="http://schemas.microsoft.com/office/2006/metadata/properties" ma:root="true" ma:fieldsID="d014951b45a5d9b1402ae11632260839" ns3:_="" ns4:_="">
     <xsd:import namespace="58bd19be-68b1-440c-82af-6d4de24fec6c"/>
@@ -5004,32 +5004,33 @@
 </ct:contentTypeSchema>
 </file>
 
+<file path=customXml/item3.xml><?xml version="1.0" encoding="utf-8"?>
+<?mso-contentType ?>
+<FormTemplates xmlns="http://schemas.microsoft.com/sharepoint/v3/contenttype/forms">
+  <Display>DocumentLibraryForm</Display>
+  <Edit>DocumentLibraryForm</Edit>
+  <New>DocumentLibraryForm</New>
+</FormTemplates>
+</file>
+
 <file path=customXml/itemProps1.xml><?xml version="1.0" encoding="utf-8"?>
 <ds:datastoreItem xmlns:ds="http://schemas.openxmlformats.org/officeDocument/2006/customXml" ds:itemID="{9F6BBB3A-79CE-45DB-AF40-EE534FC6FF6F}">
   <ds:schemaRefs>
     <ds:schemaRef ds:uri="http://schemas.microsoft.com/office/2006/documentManagement/types"/>
     <ds:schemaRef ds:uri="http://www.w3.org/XML/1998/namespace"/>
+    <ds:schemaRef ds:uri="http://purl.org/dc/dcmitype/"/>
+    <ds:schemaRef ds:uri="http://purl.org/dc/terms/"/>
+    <ds:schemaRef ds:uri="http://schemas.openxmlformats.org/package/2006/metadata/core-properties"/>
+    <ds:schemaRef ds:uri="http://schemas.microsoft.com/office/infopath/2007/PartnerControls"/>
+    <ds:schemaRef ds:uri="3ffc9a63-5890-437d-bab6-67d84705b086"/>
+    <ds:schemaRef ds:uri="58bd19be-68b1-440c-82af-6d4de24fec6c"/>
     <ds:schemaRef ds:uri="http://schemas.microsoft.com/office/2006/metadata/properties"/>
-    <ds:schemaRef ds:uri="3ffc9a63-5890-437d-bab6-67d84705b086"/>
     <ds:schemaRef ds:uri="http://purl.org/dc/elements/1.1/"/>
-    <ds:schemaRef ds:uri="http://purl.org/dc/terms/"/>
-    <ds:schemaRef ds:uri="http://schemas.microsoft.com/office/infopath/2007/PartnerControls"/>
-    <ds:schemaRef ds:uri="http://schemas.openxmlformats.org/package/2006/metadata/core-properties"/>
-    <ds:schemaRef ds:uri="58bd19be-68b1-440c-82af-6d4de24fec6c"/>
-    <ds:schemaRef ds:uri="http://purl.org/dc/dcmitype/"/>
   </ds:schemaRefs>
 </ds:datastoreItem>
 </file>
 
 <file path=customXml/itemProps2.xml><?xml version="1.0" encoding="utf-8"?>
-<ds:datastoreItem xmlns:ds="http://schemas.openxmlformats.org/officeDocument/2006/customXml" ds:itemID="{E38709BF-394A-46A4-90AF-DB51E8421FDB}">
-  <ds:schemaRefs>
-    <ds:schemaRef ds:uri="http://schemas.microsoft.com/sharepoint/v3/contenttype/forms"/>
-  </ds:schemaRefs>
-</ds:datastoreItem>
-</file>
-
-<file path=customXml/itemProps3.xml><?xml version="1.0" encoding="utf-8"?>
 <ds:datastoreItem xmlns:ds="http://schemas.openxmlformats.org/officeDocument/2006/customXml" ds:itemID="{1FC2AB0F-0831-4AC4-8F82-A5526CF04CD6}">
   <ds:schemaRefs>
     <ds:schemaRef ds:uri="http://schemas.microsoft.com/office/2006/metadata/contentType"/>
@@ -5046,4 +5047,12 @@
     <ds:schemaRef ds:uri="http://schemas.microsoft.com/internal/obd"/>
   </ds:schemaRefs>
 </ds:datastoreItem>
+</file>
+
+<file path=customXml/itemProps3.xml><?xml version="1.0" encoding="utf-8"?>
+<ds:datastoreItem xmlns:ds="http://schemas.openxmlformats.org/officeDocument/2006/customXml" ds:itemID="{E38709BF-394A-46A4-90AF-DB51E8421FDB}">
+  <ds:schemaRefs>
+    <ds:schemaRef ds:uri="http://schemas.microsoft.com/sharepoint/v3/contenttype/forms"/>
+  </ds:schemaRefs>
+</ds:datastoreItem>
 </file>
</xml_diff>